<commit_message>
update thesis work and overview diagram
</commit_message>
<xml_diff>
--- a/overview_diagram.pptx
+++ b/overview_diagram.pptx
@@ -104,6 +104,11 @@
       </a:defRPr>
     </a:lvl9pPr>
   </p:defaultTextStyle>
+  <p:extLst>
+    <p:ext uri="{EFAFB233-063F-42B5-8137-9DF3F51BA10A}">
+      <p15:sldGuideLst xmlns:p15="http://schemas.microsoft.com/office/powerpoint/2012/main"/>
+    </p:ext>
+  </p:extLst>
 </p:presentation>
 </file>
 
@@ -254,7 +259,7 @@
           <a:p>
             <a:fld id="{4304C867-92C0-4056-A64D-7D671271E576}" type="datetimeFigureOut">
               <a:rPr lang="hu-HU" smtClean="0"/>
-              <a:t>2023. 11. 27.</a:t>
+              <a:t>2024. 05. 08.</a:t>
             </a:fld>
             <a:endParaRPr lang="hu-HU"/>
           </a:p>
@@ -452,7 +457,7 @@
           <a:p>
             <a:fld id="{4304C867-92C0-4056-A64D-7D671271E576}" type="datetimeFigureOut">
               <a:rPr lang="hu-HU" smtClean="0"/>
-              <a:t>2023. 11. 27.</a:t>
+              <a:t>2024. 05. 08.</a:t>
             </a:fld>
             <a:endParaRPr lang="hu-HU"/>
           </a:p>
@@ -660,7 +665,7 @@
           <a:p>
             <a:fld id="{4304C867-92C0-4056-A64D-7D671271E576}" type="datetimeFigureOut">
               <a:rPr lang="hu-HU" smtClean="0"/>
-              <a:t>2023. 11. 27.</a:t>
+              <a:t>2024. 05. 08.</a:t>
             </a:fld>
             <a:endParaRPr lang="hu-HU"/>
           </a:p>
@@ -858,7 +863,7 @@
           <a:p>
             <a:fld id="{4304C867-92C0-4056-A64D-7D671271E576}" type="datetimeFigureOut">
               <a:rPr lang="hu-HU" smtClean="0"/>
-              <a:t>2023. 11. 27.</a:t>
+              <a:t>2024. 05. 08.</a:t>
             </a:fld>
             <a:endParaRPr lang="hu-HU"/>
           </a:p>
@@ -1133,7 +1138,7 @@
           <a:p>
             <a:fld id="{4304C867-92C0-4056-A64D-7D671271E576}" type="datetimeFigureOut">
               <a:rPr lang="hu-HU" smtClean="0"/>
-              <a:t>2023. 11. 27.</a:t>
+              <a:t>2024. 05. 08.</a:t>
             </a:fld>
             <a:endParaRPr lang="hu-HU"/>
           </a:p>
@@ -1398,7 +1403,7 @@
           <a:p>
             <a:fld id="{4304C867-92C0-4056-A64D-7D671271E576}" type="datetimeFigureOut">
               <a:rPr lang="hu-HU" smtClean="0"/>
-              <a:t>2023. 11. 27.</a:t>
+              <a:t>2024. 05. 08.</a:t>
             </a:fld>
             <a:endParaRPr lang="hu-HU"/>
           </a:p>
@@ -1810,7 +1815,7 @@
           <a:p>
             <a:fld id="{4304C867-92C0-4056-A64D-7D671271E576}" type="datetimeFigureOut">
               <a:rPr lang="hu-HU" smtClean="0"/>
-              <a:t>2023. 11. 27.</a:t>
+              <a:t>2024. 05. 08.</a:t>
             </a:fld>
             <a:endParaRPr lang="hu-HU"/>
           </a:p>
@@ -1951,7 +1956,7 @@
           <a:p>
             <a:fld id="{4304C867-92C0-4056-A64D-7D671271E576}" type="datetimeFigureOut">
               <a:rPr lang="hu-HU" smtClean="0"/>
-              <a:t>2023. 11. 27.</a:t>
+              <a:t>2024. 05. 08.</a:t>
             </a:fld>
             <a:endParaRPr lang="hu-HU"/>
           </a:p>
@@ -2064,7 +2069,7 @@
           <a:p>
             <a:fld id="{4304C867-92C0-4056-A64D-7D671271E576}" type="datetimeFigureOut">
               <a:rPr lang="hu-HU" smtClean="0"/>
-              <a:t>2023. 11. 27.</a:t>
+              <a:t>2024. 05. 08.</a:t>
             </a:fld>
             <a:endParaRPr lang="hu-HU"/>
           </a:p>
@@ -2375,7 +2380,7 @@
           <a:p>
             <a:fld id="{4304C867-92C0-4056-A64D-7D671271E576}" type="datetimeFigureOut">
               <a:rPr lang="hu-HU" smtClean="0"/>
-              <a:t>2023. 11. 27.</a:t>
+              <a:t>2024. 05. 08.</a:t>
             </a:fld>
             <a:endParaRPr lang="hu-HU"/>
           </a:p>
@@ -2663,7 +2668,7 @@
           <a:p>
             <a:fld id="{4304C867-92C0-4056-A64D-7D671271E576}" type="datetimeFigureOut">
               <a:rPr lang="hu-HU" smtClean="0"/>
-              <a:t>2023. 11. 27.</a:t>
+              <a:t>2024. 05. 08.</a:t>
             </a:fld>
             <a:endParaRPr lang="hu-HU"/>
           </a:p>
@@ -2904,7 +2909,7 @@
           <a:p>
             <a:fld id="{4304C867-92C0-4056-A64D-7D671271E576}" type="datetimeFigureOut">
               <a:rPr lang="hu-HU" smtClean="0"/>
-              <a:t>2023. 11. 27.</a:t>
+              <a:t>2024. 05. 08.</a:t>
             </a:fld>
             <a:endParaRPr lang="hu-HU"/>
           </a:p>
@@ -3335,8 +3340,8 @@
         </p:nvSpPr>
         <p:spPr>
           <a:xfrm>
-            <a:off x="6768598" y="1675261"/>
-            <a:ext cx="2197281" cy="2274657"/>
+            <a:off x="6768598" y="573206"/>
+            <a:ext cx="2197281" cy="3376712"/>
           </a:xfrm>
           <a:prstGeom prst="roundRect">
             <a:avLst/>
@@ -3531,7 +3536,7 @@
         </p:nvSpPr>
         <p:spPr>
           <a:xfrm>
-            <a:off x="1856096" y="5182737"/>
+            <a:off x="1719616" y="5182737"/>
             <a:ext cx="1978926" cy="876869"/>
           </a:xfrm>
           <a:prstGeom prst="roundRect">
@@ -3688,7 +3693,7 @@
         </p:nvSpPr>
         <p:spPr>
           <a:xfrm>
-            <a:off x="4067035" y="5182737"/>
+            <a:off x="3930555" y="5182737"/>
             <a:ext cx="1978927" cy="876869"/>
           </a:xfrm>
           <a:prstGeom prst="roundRect">
@@ -3768,7 +3773,7 @@
         </p:nvSpPr>
         <p:spPr>
           <a:xfrm>
-            <a:off x="6646465" y="5182737"/>
+            <a:off x="6045960" y="5182737"/>
             <a:ext cx="1978927" cy="876868"/>
           </a:xfrm>
           <a:prstGeom prst="roundRect">
@@ -3829,7 +3834,7 @@
         </p:nvSpPr>
         <p:spPr>
           <a:xfrm>
-            <a:off x="8857405" y="5182737"/>
+            <a:off x="8065829" y="5182737"/>
             <a:ext cx="1978927" cy="876868"/>
           </a:xfrm>
           <a:prstGeom prst="roundRect">
@@ -3909,7 +3914,7 @@
         </p:nvSpPr>
         <p:spPr>
           <a:xfrm>
-            <a:off x="1856096" y="6059605"/>
+            <a:off x="1719616" y="6059605"/>
             <a:ext cx="4189866" cy="337781"/>
           </a:xfrm>
           <a:prstGeom prst="roundRect">
@@ -4015,7 +4020,7 @@
         </p:nvSpPr>
         <p:spPr>
           <a:xfrm>
-            <a:off x="6646465" y="6059604"/>
+            <a:off x="6878481" y="6059604"/>
             <a:ext cx="4189866" cy="337781"/>
           </a:xfrm>
           <a:prstGeom prst="roundRect">
@@ -5272,8 +5277,8 @@
         </p:nvCxnSpPr>
         <p:spPr>
           <a:xfrm rot="5400000" flipH="1" flipV="1">
-            <a:off x="3383729" y="3514505"/>
-            <a:ext cx="1130062" cy="2206402"/>
+            <a:off x="3315489" y="3446265"/>
+            <a:ext cx="1130062" cy="2342882"/>
           </a:xfrm>
           <a:prstGeom prst="curvedConnector3">
             <a:avLst/>
@@ -5315,9 +5320,9 @@
           <p:nvPr/>
         </p:nvCxnSpPr>
         <p:spPr>
-          <a:xfrm flipH="1" flipV="1">
-            <a:off x="5051961" y="4052675"/>
-            <a:ext cx="4538" cy="1130062"/>
+          <a:xfrm flipV="1">
+            <a:off x="4920019" y="4052675"/>
+            <a:ext cx="131942" cy="1130062"/>
           </a:xfrm>
           <a:prstGeom prst="straightConnector1">
             <a:avLst/>
@@ -5360,8 +5365,8 @@
         </p:nvCxnSpPr>
         <p:spPr>
           <a:xfrm rot="5400000">
-            <a:off x="1846757" y="4177104"/>
-            <a:ext cx="2004435" cy="6830"/>
+            <a:off x="1778517" y="4108864"/>
+            <a:ext cx="2004435" cy="143310"/>
           </a:xfrm>
           <a:prstGeom prst="curvedConnector3">
             <a:avLst/>
@@ -5404,8 +5409,8 @@
         </p:nvCxnSpPr>
         <p:spPr>
           <a:xfrm rot="16200000" flipH="1">
-            <a:off x="2952227" y="3078464"/>
-            <a:ext cx="2004435" cy="2204110"/>
+            <a:off x="2883987" y="3146704"/>
+            <a:ext cx="2004435" cy="2067630"/>
           </a:xfrm>
           <a:prstGeom prst="curvedConnector3">
             <a:avLst/>
@@ -5447,8 +5452,8 @@
         </p:nvCxnSpPr>
         <p:spPr>
           <a:xfrm rot="5400000" flipH="1" flipV="1">
-            <a:off x="9823459" y="4097075"/>
-            <a:ext cx="1109073" cy="1062252"/>
+            <a:off x="9427671" y="3701287"/>
+            <a:ext cx="1109073" cy="1853828"/>
           </a:xfrm>
           <a:prstGeom prst="curvedConnector3">
             <a:avLst/>
@@ -5490,8 +5495,8 @@
         </p:nvCxnSpPr>
         <p:spPr>
           <a:xfrm rot="5400000" flipH="1" flipV="1">
-            <a:off x="8717989" y="2991605"/>
-            <a:ext cx="1109073" cy="3273192"/>
+            <a:off x="8417736" y="2691353"/>
+            <a:ext cx="1109073" cy="3873697"/>
           </a:xfrm>
           <a:prstGeom prst="curvedConnector3">
             <a:avLst/>
@@ -5776,6 +5781,7 @@
             </a:extLst>
           </p:cNvPr>
           <p:cNvCxnSpPr>
+            <a:cxnSpLocks/>
             <a:stCxn id="8" idx="0"/>
             <a:endCxn id="50" idx="2"/>
           </p:cNvCxnSpPr>
@@ -5783,8 +5789,8 @@
         </p:nvCxnSpPr>
         <p:spPr>
           <a:xfrm rot="5400000" flipH="1" flipV="1">
-            <a:off x="7135175" y="4450673"/>
-            <a:ext cx="1232819" cy="231310"/>
+            <a:off x="6834922" y="4150421"/>
+            <a:ext cx="1232819" cy="831815"/>
           </a:xfrm>
           <a:prstGeom prst="curvedConnector3">
             <a:avLst/>
@@ -5819,6 +5825,7 @@
             </a:extLst>
           </p:cNvPr>
           <p:cNvCxnSpPr>
+            <a:cxnSpLocks/>
             <a:stCxn id="9" idx="0"/>
             <a:endCxn id="50" idx="2"/>
           </p:cNvCxnSpPr>
@@ -5826,8 +5833,8 @@
         </p:nvCxnSpPr>
         <p:spPr>
           <a:xfrm rot="16200000" flipV="1">
-            <a:off x="8240645" y="3576513"/>
-            <a:ext cx="1232819" cy="1979630"/>
+            <a:off x="7844857" y="3972301"/>
+            <a:ext cx="1232819" cy="1188054"/>
           </a:xfrm>
           <a:prstGeom prst="curvedConnector3">
             <a:avLst/>
@@ -5852,6 +5859,192 @@
           </a:fontRef>
         </p:style>
       </p:cxnSp>
+      <p:sp>
+        <p:nvSpPr>
+          <p:cNvPr id="2" name="Téglalap: lekerekített 1">
+            <a:extLst>
+              <a:ext uri="{FF2B5EF4-FFF2-40B4-BE49-F238E27FC236}">
+                <a16:creationId xmlns:a16="http://schemas.microsoft.com/office/drawing/2014/main" id="{0D4BB82D-2C49-FB8F-0DF7-6BD85F7E506E}"/>
+              </a:ext>
+            </a:extLst>
+          </p:cNvPr>
+          <p:cNvSpPr/>
+          <p:nvPr/>
+        </p:nvSpPr>
+        <p:spPr>
+          <a:xfrm>
+            <a:off x="10097081" y="5182737"/>
+            <a:ext cx="1978927" cy="876868"/>
+          </a:xfrm>
+          <a:prstGeom prst="roundRect">
+            <a:avLst/>
+          </a:prstGeom>
+          <a:solidFill>
+            <a:srgbClr val="FFD141"/>
+          </a:solidFill>
+        </p:spPr>
+        <p:style>
+          <a:lnRef idx="2">
+            <a:schemeClr val="accent1">
+              <a:shade val="15000"/>
+            </a:schemeClr>
+          </a:lnRef>
+          <a:fillRef idx="1">
+            <a:schemeClr val="accent1"/>
+          </a:fillRef>
+          <a:effectRef idx="0">
+            <a:schemeClr val="accent1"/>
+          </a:effectRef>
+          <a:fontRef idx="minor">
+            <a:schemeClr val="lt1"/>
+          </a:fontRef>
+        </p:style>
+        <p:txBody>
+          <a:bodyPr rtlCol="0" anchor="ctr"/>
+          <a:lstStyle/>
+          <a:p>
+            <a:pPr algn="ctr"/>
+            <a:r>
+              <a:rPr lang="hu-HU" dirty="0" err="1">
+                <a:solidFill>
+                  <a:schemeClr val="tx1"/>
+                </a:solidFill>
+              </a:rPr>
+              <a:t>Classification</a:t>
+            </a:r>
+            <a:r>
+              <a:rPr lang="hu-HU">
+                <a:solidFill>
+                  <a:schemeClr val="tx1"/>
+                </a:solidFill>
+              </a:rPr>
+              <a:t>…</a:t>
+            </a:r>
+            <a:endParaRPr lang="hu-HU" dirty="0">
+              <a:solidFill>
+                <a:schemeClr val="tx1"/>
+              </a:solidFill>
+            </a:endParaRPr>
+          </a:p>
+        </p:txBody>
+      </p:sp>
+      <p:sp>
+        <p:nvSpPr>
+          <p:cNvPr id="3" name="Téglalap: lekerekített 2">
+            <a:extLst>
+              <a:ext uri="{FF2B5EF4-FFF2-40B4-BE49-F238E27FC236}">
+                <a16:creationId xmlns:a16="http://schemas.microsoft.com/office/drawing/2014/main" id="{B29D717D-4E77-8DD6-F387-BD81CC16C1E5}"/>
+              </a:ext>
+            </a:extLst>
+          </p:cNvPr>
+          <p:cNvSpPr/>
+          <p:nvPr/>
+        </p:nvSpPr>
+        <p:spPr>
+          <a:xfrm>
+            <a:off x="6862124" y="731370"/>
+            <a:ext cx="1978927" cy="876868"/>
+          </a:xfrm>
+          <a:prstGeom prst="roundRect">
+            <a:avLst/>
+          </a:prstGeom>
+          <a:gradFill flip="none" rotWithShape="1">
+            <a:gsLst>
+              <a:gs pos="0">
+                <a:srgbClr val="FFD141">
+                  <a:tint val="66000"/>
+                  <a:satMod val="160000"/>
+                </a:srgbClr>
+              </a:gs>
+              <a:gs pos="50000">
+                <a:srgbClr val="FFD141">
+                  <a:tint val="44500"/>
+                  <a:satMod val="160000"/>
+                </a:srgbClr>
+              </a:gs>
+              <a:gs pos="100000">
+                <a:srgbClr val="FFD141">
+                  <a:tint val="23500"/>
+                  <a:satMod val="160000"/>
+                </a:srgbClr>
+              </a:gs>
+            </a:gsLst>
+            <a:lin ang="16200000" scaled="1"/>
+            <a:tileRect/>
+          </a:gradFill>
+        </p:spPr>
+        <p:style>
+          <a:lnRef idx="2">
+            <a:schemeClr val="accent1">
+              <a:shade val="15000"/>
+            </a:schemeClr>
+          </a:lnRef>
+          <a:fillRef idx="1">
+            <a:schemeClr val="accent1"/>
+          </a:fillRef>
+          <a:effectRef idx="0">
+            <a:schemeClr val="accent1"/>
+          </a:effectRef>
+          <a:fontRef idx="minor">
+            <a:schemeClr val="lt1"/>
+          </a:fontRef>
+        </p:style>
+        <p:txBody>
+          <a:bodyPr rtlCol="0" anchor="ctr"/>
+          <a:lstStyle/>
+          <a:p>
+            <a:pPr algn="ctr"/>
+            <a:r>
+              <a:rPr lang="hu-HU" dirty="0" err="1">
+                <a:solidFill>
+                  <a:schemeClr val="tx1"/>
+                </a:solidFill>
+              </a:rPr>
+              <a:t>Modules</a:t>
+            </a:r>
+            <a:r>
+              <a:rPr lang="hu-HU" dirty="0">
+                <a:solidFill>
+                  <a:schemeClr val="tx1"/>
+                </a:solidFill>
+              </a:rPr>
+              <a:t> </a:t>
+            </a:r>
+            <a:r>
+              <a:rPr lang="hu-HU" dirty="0" err="1">
+                <a:solidFill>
+                  <a:schemeClr val="tx1"/>
+                </a:solidFill>
+              </a:rPr>
+              <a:t>for</a:t>
+            </a:r>
+            <a:r>
+              <a:rPr lang="hu-HU" dirty="0">
+                <a:solidFill>
+                  <a:schemeClr val="tx1"/>
+                </a:solidFill>
+              </a:rPr>
+              <a:t> </a:t>
+            </a:r>
+            <a:r>
+              <a:rPr lang="hu-HU" dirty="0" err="1">
+                <a:solidFill>
+                  <a:schemeClr val="tx1"/>
+                </a:solidFill>
+              </a:rPr>
+              <a:t>classification</a:t>
+            </a:r>
+            <a:r>
+              <a:rPr lang="hu-HU" dirty="0">
+                <a:solidFill>
+                  <a:schemeClr val="tx1"/>
+                </a:solidFill>
+              </a:rPr>
+              <a:t>…</a:t>
+            </a:r>
+          </a:p>
+        </p:txBody>
+      </p:sp>
     </p:spTree>
     <p:extLst>
       <p:ext uri="{BB962C8B-B14F-4D97-AF65-F5344CB8AC3E}">

</xml_diff>